<commit_message>
design vermelho + mockup init
</commit_message>
<xml_diff>
--- a/Powerpoint/CARBONTOWER-v2.0.pptx
+++ b/Powerpoint/CARBONTOWER-v2.0.pptx
@@ -276,7 +276,7 @@
           <a:p>
             <a:fld id="{F0ED955F-D8D6-CE41-B014-F2E9EF585494}" type="datetimeFigureOut">
               <a:rPr lang="en-US" smtClean="0"/>
-              <a:t>4/11/2019</a:t>
+              <a:t>4/15/2019</a:t>
             </a:fld>
             <a:endParaRPr lang="en-US"/>
           </a:p>
@@ -474,7 +474,7 @@
           <a:p>
             <a:fld id="{F0ED955F-D8D6-CE41-B014-F2E9EF585494}" type="datetimeFigureOut">
               <a:rPr lang="en-US" smtClean="0"/>
-              <a:t>4/11/2019</a:t>
+              <a:t>4/15/2019</a:t>
             </a:fld>
             <a:endParaRPr lang="en-US"/>
           </a:p>
@@ -682,7 +682,7 @@
           <a:p>
             <a:fld id="{F0ED955F-D8D6-CE41-B014-F2E9EF585494}" type="datetimeFigureOut">
               <a:rPr lang="en-US" smtClean="0"/>
-              <a:t>4/11/2019</a:t>
+              <a:t>4/15/2019</a:t>
             </a:fld>
             <a:endParaRPr lang="en-US"/>
           </a:p>
@@ -880,7 +880,7 @@
           <a:p>
             <a:fld id="{F0ED955F-D8D6-CE41-B014-F2E9EF585494}" type="datetimeFigureOut">
               <a:rPr lang="en-US" smtClean="0"/>
-              <a:t>4/11/2019</a:t>
+              <a:t>4/15/2019</a:t>
             </a:fld>
             <a:endParaRPr lang="en-US"/>
           </a:p>
@@ -1155,7 +1155,7 @@
           <a:p>
             <a:fld id="{F0ED955F-D8D6-CE41-B014-F2E9EF585494}" type="datetimeFigureOut">
               <a:rPr lang="en-US" smtClean="0"/>
-              <a:t>4/11/2019</a:t>
+              <a:t>4/15/2019</a:t>
             </a:fld>
             <a:endParaRPr lang="en-US"/>
           </a:p>
@@ -1420,7 +1420,7 @@
           <a:p>
             <a:fld id="{F0ED955F-D8D6-CE41-B014-F2E9EF585494}" type="datetimeFigureOut">
               <a:rPr lang="en-US" smtClean="0"/>
-              <a:t>4/11/2019</a:t>
+              <a:t>4/15/2019</a:t>
             </a:fld>
             <a:endParaRPr lang="en-US"/>
           </a:p>
@@ -1832,7 +1832,7 @@
           <a:p>
             <a:fld id="{F0ED955F-D8D6-CE41-B014-F2E9EF585494}" type="datetimeFigureOut">
               <a:rPr lang="en-US" smtClean="0"/>
-              <a:t>4/11/2019</a:t>
+              <a:t>4/15/2019</a:t>
             </a:fld>
             <a:endParaRPr lang="en-US"/>
           </a:p>
@@ -1973,7 +1973,7 @@
           <a:p>
             <a:fld id="{F0ED955F-D8D6-CE41-B014-F2E9EF585494}" type="datetimeFigureOut">
               <a:rPr lang="en-US" smtClean="0"/>
-              <a:t>4/11/2019</a:t>
+              <a:t>4/15/2019</a:t>
             </a:fld>
             <a:endParaRPr lang="en-US"/>
           </a:p>
@@ -2086,7 +2086,7 @@
           <a:p>
             <a:fld id="{F0ED955F-D8D6-CE41-B014-F2E9EF585494}" type="datetimeFigureOut">
               <a:rPr lang="en-US" smtClean="0"/>
-              <a:t>4/11/2019</a:t>
+              <a:t>4/15/2019</a:t>
             </a:fld>
             <a:endParaRPr lang="en-US"/>
           </a:p>
@@ -2397,7 +2397,7 @@
           <a:p>
             <a:fld id="{F0ED955F-D8D6-CE41-B014-F2E9EF585494}" type="datetimeFigureOut">
               <a:rPr lang="en-US" smtClean="0"/>
-              <a:t>4/11/2019</a:t>
+              <a:t>4/15/2019</a:t>
             </a:fld>
             <a:endParaRPr lang="en-US"/>
           </a:p>
@@ -2685,7 +2685,7 @@
           <a:p>
             <a:fld id="{F0ED955F-D8D6-CE41-B014-F2E9EF585494}" type="datetimeFigureOut">
               <a:rPr lang="en-US" smtClean="0"/>
-              <a:t>4/11/2019</a:t>
+              <a:t>4/15/2019</a:t>
             </a:fld>
             <a:endParaRPr lang="en-US"/>
           </a:p>
@@ -2931,7 +2931,7 @@
           <a:p>
             <a:fld id="{F0ED955F-D8D6-CE41-B014-F2E9EF585494}" type="datetimeFigureOut">
               <a:rPr lang="en-US" smtClean="0"/>
-              <a:t>4/11/2019</a:t>
+              <a:t>4/15/2019</a:t>
             </a:fld>
             <a:endParaRPr lang="en-US"/>
           </a:p>
@@ -3568,47 +3568,22 @@
           </p:cNvPicPr>
           <p:nvPr/>
         </p:nvPicPr>
-        <p:blipFill rotWithShape="1">
+        <p:blipFill>
           <a:blip r:embed="rId6">
             <a:extLst>
-              <a:ext uri="{BEBA8EAE-BF5A-486C-A8C5-ECC9F3942E4B}">
-                <a14:imgProps xmlns:a14="http://schemas.microsoft.com/office/drawing/2010/main">
-                  <a14:imgLayer r:embed="rId7">
-                    <a14:imgEffect>
-                      <a14:backgroundRemoval t="0" b="98802" l="24792" r="100000">
-                        <a14:foregroundMark x1="33943" y1="36527" x2="33943" y2="36527"/>
-                        <a14:foregroundMark x1="41930" y1="12575" x2="41930" y2="12575"/>
-                        <a14:foregroundMark x1="54409" y1="34132" x2="54409" y2="34132"/>
-                        <a14:foregroundMark x1="61897" y1="32934" x2="61897" y2="32934"/>
-                        <a14:foregroundMark x1="80532" y1="34132" x2="80532" y2="34132"/>
-                        <a14:foregroundMark x1="87687" y1="69461" x2="87687" y2="69461"/>
-                        <a14:foregroundMark x1="92013" y1="70060" x2="92013" y2="70060"/>
-                        <a14:foregroundMark x1="77205" y1="68263" x2="77205" y2="68263"/>
-                        <a14:foregroundMark x1="72712" y1="71257" x2="72712" y2="71257"/>
-                        <a14:foregroundMark x1="63561" y1="70060" x2="63561" y2="70060"/>
-                        <a14:foregroundMark x1="50083" y1="70060" x2="50083" y2="70060"/>
-                        <a14:foregroundMark x1="41764" y1="71856" x2="41764" y2="71856"/>
-                        <a14:foregroundMark x1="27787" y1="71856" x2="27787" y2="71856"/>
-                      </a14:backgroundRemoval>
-                    </a14:imgEffect>
-                    <a14:imgEffect>
-                      <a14:brightnessContrast bright="53000" contrast="-64000"/>
-                    </a14:imgEffect>
-                  </a14:imgLayer>
-                </a14:imgProps>
-              </a:ext>
               <a:ext uri="{28A0092B-C50C-407E-A947-70E740481C1C}">
                 <a14:useLocalDpi xmlns:a14="http://schemas.microsoft.com/office/drawing/2010/main" val="0"/>
               </a:ext>
             </a:extLst>
           </a:blip>
-          <a:srcRect l="25732"/>
-          <a:stretch/>
+          <a:stretch>
+            <a:fillRect/>
+          </a:stretch>
         </p:blipFill>
         <p:spPr>
           <a:xfrm>
-            <a:off x="4872311" y="3727411"/>
-            <a:ext cx="2447369" cy="915676"/>
+            <a:off x="4821742" y="3655791"/>
+            <a:ext cx="2548503" cy="1019401"/>
           </a:xfrm>
           <a:prstGeom prst="rect">
             <a:avLst/>
@@ -16615,6 +16590,15 @@
 </file>
 
 <file path=customXml/item2.xml><?xml version="1.0" encoding="utf-8"?>
+<?mso-contentType ?>
+<FormTemplates xmlns="http://schemas.microsoft.com/sharepoint/v3/contenttype/forms">
+  <Display>DocumentLibraryForm</Display>
+  <Edit>DocumentLibraryForm</Edit>
+  <New>DocumentLibraryForm</New>
+</FormTemplates>
+</file>
+
+<file path=customXml/item3.xml><?xml version="1.0" encoding="utf-8"?>
 <ct:contentTypeSchema xmlns:ct="http://schemas.microsoft.com/office/2006/metadata/contentType" xmlns:ma="http://schemas.microsoft.com/office/2006/metadata/properties/metaAttributes" ct:_="" ma:_="" ma:contentTypeName="Documento" ma:contentTypeID="0x01010049EF22FAA227184C9F17DB94FF991B99" ma:contentTypeVersion="4" ma:contentTypeDescription="Crie um novo documento." ma:contentTypeScope="" ma:versionID="442411e1f160c779f1992de5e0fb256a">
   <xsd:schema xmlns:xsd="http://www.w3.org/2001/XMLSchema" xmlns:xs="http://www.w3.org/2001/XMLSchema" xmlns:p="http://schemas.microsoft.com/office/2006/metadata/properties" xmlns:ns2="020b5f2f-eb9b-4b5b-ac28-78b24d18aac0" targetNamespace="http://schemas.microsoft.com/office/2006/metadata/properties" ma:root="true" ma:fieldsID="77a5a8c295f322286c01b5981d5f1d8b" ns2:_="">
     <xsd:import namespace="020b5f2f-eb9b-4b5b-ac28-78b24d18aac0"/>
@@ -16760,15 +16744,6 @@
 </ct:contentTypeSchema>
 </file>
 
-<file path=customXml/item3.xml><?xml version="1.0" encoding="utf-8"?>
-<?mso-contentType ?>
-<FormTemplates xmlns="http://schemas.microsoft.com/sharepoint/v3/contenttype/forms">
-  <Display>DocumentLibraryForm</Display>
-  <Edit>DocumentLibraryForm</Edit>
-  <New>DocumentLibraryForm</New>
-</FormTemplates>
-</file>
-
 <file path=customXml/itemProps1.xml><?xml version="1.0" encoding="utf-8"?>
 <ds:datastoreItem xmlns:ds="http://schemas.openxmlformats.org/officeDocument/2006/customXml" ds:itemID="{55798A40-9FAD-445E-91C1-7CEFB25D743E}">
   <ds:schemaRefs>
@@ -16779,6 +16754,14 @@
 </file>
 
 <file path=customXml/itemProps2.xml><?xml version="1.0" encoding="utf-8"?>
+<ds:datastoreItem xmlns:ds="http://schemas.openxmlformats.org/officeDocument/2006/customXml" ds:itemID="{370E4D61-1BE4-4B15-A784-AD2954D7A6D9}">
+  <ds:schemaRefs>
+    <ds:schemaRef ds:uri="http://schemas.microsoft.com/sharepoint/v3/contenttype/forms"/>
+  </ds:schemaRefs>
+</ds:datastoreItem>
+</file>
+
+<file path=customXml/itemProps3.xml><?xml version="1.0" encoding="utf-8"?>
 <ds:datastoreItem xmlns:ds="http://schemas.openxmlformats.org/officeDocument/2006/customXml" ds:itemID="{29EA2E90-B8E6-4B7F-88C3-E8C22CC710BC}">
   <ds:schemaRefs>
     <ds:schemaRef ds:uri="http://schemas.microsoft.com/office/2006/metadata/contentType"/>
@@ -16794,12 +16777,4 @@
     <ds:schemaRef ds:uri="http://schemas.microsoft.com/internal/obd"/>
   </ds:schemaRefs>
 </ds:datastoreItem>
-</file>
-
-<file path=customXml/itemProps3.xml><?xml version="1.0" encoding="utf-8"?>
-<ds:datastoreItem xmlns:ds="http://schemas.openxmlformats.org/officeDocument/2006/customXml" ds:itemID="{370E4D61-1BE4-4B15-A784-AD2954D7A6D9}">
-  <ds:schemaRefs>
-    <ds:schemaRef ds:uri="http://schemas.microsoft.com/sharepoint/v3/contenttype/forms"/>
-  </ds:schemaRefs>
-</ds:datastoreItem>
 </file>
</xml_diff>